<commit_message>
Sistemato script e presentazione
</commit_message>
<xml_diff>
--- a/presentazione_imad.pptx
+++ b/presentazione_imad.pptx
@@ -8938,7 +8938,7 @@
           <a:p>
             <a:fld id="{7BD18282-EB19-435E-9AF0-4FCC595C3971}" type="datetimeFigureOut">
               <a:rPr lang="it-IT" smtClean="0"/>
-              <a:t>09/05/2019</a:t>
+              <a:t>10/05/2019</a:t>
             </a:fld>
             <a:endParaRPr lang="it-IT"/>
           </a:p>
@@ -9348,7 +9348,7 @@
             <a:fld id="{B61BEF0D-F0BB-DE4B-95CE-6DB70DBA9567}" type="datetimeFigureOut">
               <a:rPr lang="en-US" smtClean="0"/>
               <a:pPr/>
-              <a:t>5/9/2019</a:t>
+              <a:t>5/10/2019</a:t>
             </a:fld>
             <a:endParaRPr lang="en-US" dirty="0"/>
           </a:p>
@@ -9532,7 +9532,7 @@
             <a:fld id="{B61BEF0D-F0BB-DE4B-95CE-6DB70DBA9567}" type="datetimeFigureOut">
               <a:rPr lang="en-US" smtClean="0"/>
               <a:pPr/>
-              <a:t>5/9/2019</a:t>
+              <a:t>5/10/2019</a:t>
             </a:fld>
             <a:endParaRPr lang="en-US" dirty="0"/>
           </a:p>
@@ -9714,7 +9714,7 @@
             <a:fld id="{B61BEF0D-F0BB-DE4B-95CE-6DB70DBA9567}" type="datetimeFigureOut">
               <a:rPr lang="en-US" smtClean="0"/>
               <a:pPr/>
-              <a:t>5/9/2019</a:t>
+              <a:t>5/10/2019</a:t>
             </a:fld>
             <a:endParaRPr lang="en-US" dirty="0"/>
           </a:p>
@@ -9889,7 +9889,7 @@
             <a:fld id="{B61BEF0D-F0BB-DE4B-95CE-6DB70DBA9567}" type="datetimeFigureOut">
               <a:rPr lang="en-US" smtClean="0"/>
               <a:pPr/>
-              <a:t>5/9/2019</a:t>
+              <a:t>5/10/2019</a:t>
             </a:fld>
             <a:endParaRPr lang="en-US" dirty="0"/>
           </a:p>
@@ -10183,7 +10183,7 @@
             <a:fld id="{B61BEF0D-F0BB-DE4B-95CE-6DB70DBA9567}" type="datetimeFigureOut">
               <a:rPr lang="en-US" smtClean="0"/>
               <a:pPr/>
-              <a:t>5/9/2019</a:t>
+              <a:t>5/10/2019</a:t>
             </a:fld>
             <a:endParaRPr lang="en-US" dirty="0"/>
           </a:p>
@@ -10397,7 +10397,7 @@
             <a:fld id="{B61BEF0D-F0BB-DE4B-95CE-6DB70DBA9567}" type="datetimeFigureOut">
               <a:rPr lang="en-US" smtClean="0"/>
               <a:pPr/>
-              <a:t>5/9/2019</a:t>
+              <a:t>5/10/2019</a:t>
             </a:fld>
             <a:endParaRPr lang="en-US" dirty="0"/>
           </a:p>
@@ -10742,7 +10742,7 @@
             <a:fld id="{B61BEF0D-F0BB-DE4B-95CE-6DB70DBA9567}" type="datetimeFigureOut">
               <a:rPr lang="en-US" smtClean="0"/>
               <a:pPr/>
-              <a:t>5/9/2019</a:t>
+              <a:t>5/10/2019</a:t>
             </a:fld>
             <a:endParaRPr lang="en-US" dirty="0"/>
           </a:p>
@@ -11019,7 +11019,7 @@
             <a:fld id="{B61BEF0D-F0BB-DE4B-95CE-6DB70DBA9567}" type="datetimeFigureOut">
               <a:rPr lang="en-US" smtClean="0"/>
               <a:pPr/>
-              <a:t>5/9/2019</a:t>
+              <a:t>5/10/2019</a:t>
             </a:fld>
             <a:endParaRPr lang="en-US" dirty="0"/>
           </a:p>
@@ -11400,7 +11400,7 @@
             <a:fld id="{B61BEF0D-F0BB-DE4B-95CE-6DB70DBA9567}" type="datetimeFigureOut">
               <a:rPr lang="en-US" smtClean="0"/>
               <a:pPr/>
-              <a:t>5/9/2019</a:t>
+              <a:t>5/10/2019</a:t>
             </a:fld>
             <a:endParaRPr lang="en-US" dirty="0"/>
           </a:p>
@@ -11520,7 +11520,7 @@
             <a:fld id="{B61BEF0D-F0BB-DE4B-95CE-6DB70DBA9567}" type="datetimeFigureOut">
               <a:rPr lang="en-US" smtClean="0"/>
               <a:pPr/>
-              <a:t>5/9/2019</a:t>
+              <a:t>5/10/2019</a:t>
             </a:fld>
             <a:endParaRPr lang="en-US" dirty="0"/>
           </a:p>
@@ -11693,7 +11693,7 @@
             <a:fld id="{B61BEF0D-F0BB-DE4B-95CE-6DB70DBA9567}" type="datetimeFigureOut">
               <a:rPr lang="en-US" smtClean="0"/>
               <a:pPr/>
-              <a:t>5/9/2019</a:t>
+              <a:t>5/10/2019</a:t>
             </a:fld>
             <a:endParaRPr lang="en-US" dirty="0"/>
           </a:p>
@@ -11873,7 +11873,7 @@
             <a:fld id="{B61BEF0D-F0BB-DE4B-95CE-6DB70DBA9567}" type="datetimeFigureOut">
               <a:rPr lang="en-US" smtClean="0"/>
               <a:pPr/>
-              <a:t>5/9/2019</a:t>
+              <a:t>5/10/2019</a:t>
             </a:fld>
             <a:endParaRPr lang="en-US" dirty="0"/>
           </a:p>
@@ -12221,7 +12221,7 @@
             <a:fld id="{B61BEF0D-F0BB-DE4B-95CE-6DB70DBA9567}" type="datetimeFigureOut">
               <a:rPr lang="en-US" smtClean="0"/>
               <a:pPr/>
-              <a:t>5/9/2019</a:t>
+              <a:t>5/10/2019</a:t>
             </a:fld>
             <a:endParaRPr lang="en-US" dirty="0"/>
           </a:p>
@@ -12605,7 +12605,7 @@
             <a:fld id="{B61BEF0D-F0BB-DE4B-95CE-6DB70DBA9567}" type="datetimeFigureOut">
               <a:rPr lang="en-US" smtClean="0"/>
               <a:pPr/>
-              <a:t>5/9/2019</a:t>
+              <a:t>5/10/2019</a:t>
             </a:fld>
             <a:endParaRPr lang="en-US" dirty="0"/>
           </a:p>
@@ -12777,7 +12777,7 @@
             <a:fld id="{B61BEF0D-F0BB-DE4B-95CE-6DB70DBA9567}" type="datetimeFigureOut">
               <a:rPr lang="en-US" smtClean="0"/>
               <a:pPr/>
-              <a:t>5/9/2019</a:t>
+              <a:t>5/10/2019</a:t>
             </a:fld>
             <a:endParaRPr lang="en-US" dirty="0"/>
           </a:p>
@@ -13035,7 +13035,7 @@
             <a:fld id="{B61BEF0D-F0BB-DE4B-95CE-6DB70DBA9567}" type="datetimeFigureOut">
               <a:rPr lang="en-US" smtClean="0"/>
               <a:pPr/>
-              <a:t>5/9/2019</a:t>
+              <a:t>5/10/2019</a:t>
             </a:fld>
             <a:endParaRPr lang="en-US" dirty="0"/>
           </a:p>
@@ -13238,7 +13238,7 @@
             <a:fld id="{B61BEF0D-F0BB-DE4B-95CE-6DB70DBA9567}" type="datetimeFigureOut">
               <a:rPr lang="en-US" smtClean="0"/>
               <a:pPr/>
-              <a:t>5/9/2019</a:t>
+              <a:t>5/10/2019</a:t>
             </a:fld>
             <a:endParaRPr lang="en-US" dirty="0"/>
           </a:p>
@@ -13501,7 +13501,7 @@
             <a:fld id="{B61BEF0D-F0BB-DE4B-95CE-6DB70DBA9567}" type="datetimeFigureOut">
               <a:rPr lang="en-US" smtClean="0"/>
               <a:pPr/>
-              <a:t>5/9/2019</a:t>
+              <a:t>5/10/2019</a:t>
             </a:fld>
             <a:endParaRPr lang="en-US" dirty="0"/>
           </a:p>
@@ -13747,7 +13747,7 @@
             <a:fld id="{B61BEF0D-F0BB-DE4B-95CE-6DB70DBA9567}" type="datetimeFigureOut">
               <a:rPr lang="en-US" smtClean="0"/>
               <a:pPr/>
-              <a:t>5/9/2019</a:t>
+              <a:t>5/10/2019</a:t>
             </a:fld>
             <a:endParaRPr lang="en-US" dirty="0"/>
           </a:p>
@@ -14096,7 +14096,7 @@
             <a:fld id="{B61BEF0D-F0BB-DE4B-95CE-6DB70DBA9567}" type="datetimeFigureOut">
               <a:rPr lang="en-US" smtClean="0"/>
               <a:pPr/>
-              <a:t>5/9/2019</a:t>
+              <a:t>5/10/2019</a:t>
             </a:fld>
             <a:endParaRPr lang="en-US" dirty="0"/>
           </a:p>
@@ -14216,7 +14216,7 @@
             <a:fld id="{B61BEF0D-F0BB-DE4B-95CE-6DB70DBA9567}" type="datetimeFigureOut">
               <a:rPr lang="en-US" smtClean="0"/>
               <a:pPr/>
-              <a:t>5/9/2019</a:t>
+              <a:t>5/10/2019</a:t>
             </a:fld>
             <a:endParaRPr lang="en-US" dirty="0"/>
           </a:p>
@@ -14348,7 +14348,7 @@
             <a:fld id="{B61BEF0D-F0BB-DE4B-95CE-6DB70DBA9567}" type="datetimeFigureOut">
               <a:rPr lang="en-US" smtClean="0"/>
               <a:pPr/>
-              <a:t>5/9/2019</a:t>
+              <a:t>5/10/2019</a:t>
             </a:fld>
             <a:endParaRPr lang="en-US" dirty="0"/>
           </a:p>
@@ -14634,7 +14634,7 @@
             <a:fld id="{B61BEF0D-F0BB-DE4B-95CE-6DB70DBA9567}" type="datetimeFigureOut">
               <a:rPr lang="en-US" smtClean="0"/>
               <a:pPr/>
-              <a:t>5/9/2019</a:t>
+              <a:t>5/10/2019</a:t>
             </a:fld>
             <a:endParaRPr lang="en-US" dirty="0"/>
           </a:p>
@@ -14900,7 +14900,7 @@
             <a:fld id="{B61BEF0D-F0BB-DE4B-95CE-6DB70DBA9567}" type="datetimeFigureOut">
               <a:rPr lang="en-US" smtClean="0"/>
               <a:pPr/>
-              <a:t>5/9/2019</a:t>
+              <a:t>5/10/2019</a:t>
             </a:fld>
             <a:endParaRPr lang="en-US" dirty="0"/>
           </a:p>
@@ -15128,7 +15128,7 @@
             <a:fld id="{B61BEF0D-F0BB-DE4B-95CE-6DB70DBA9567}" type="datetimeFigureOut">
               <a:rPr lang="en-US" smtClean="0"/>
               <a:pPr/>
-              <a:t>5/9/2019</a:t>
+              <a:t>5/10/2019</a:t>
             </a:fld>
             <a:endParaRPr lang="en-US" dirty="0"/>
           </a:p>
@@ -15751,7 +15751,7 @@
             <a:fld id="{B61BEF0D-F0BB-DE4B-95CE-6DB70DBA9567}" type="datetimeFigureOut">
               <a:rPr lang="en-US" smtClean="0"/>
               <a:pPr/>
-              <a:t>5/9/2019</a:t>
+              <a:t>5/10/2019</a:t>
             </a:fld>
             <a:endParaRPr lang="en-US" dirty="0"/>
           </a:p>
@@ -17730,36 +17730,6 @@
           </a:p>
         </p:txBody>
       </p:sp>
-      <p:pic>
-        <p:nvPicPr>
-          <p:cNvPr id="4" name="Immagine 3">
-            <a:extLst>
-              <a:ext uri="{FF2B5EF4-FFF2-40B4-BE49-F238E27FC236}">
-                <a16:creationId xmlns:a16="http://schemas.microsoft.com/office/drawing/2014/main" id="{5818E2B6-77B3-46EB-91D7-2C94B8F0E80C}"/>
-              </a:ext>
-            </a:extLst>
-          </p:cNvPr>
-          <p:cNvPicPr>
-            <a:picLocks noChangeAspect="1"/>
-          </p:cNvPicPr>
-          <p:nvPr/>
-        </p:nvPicPr>
-        <p:blipFill>
-          <a:blip r:embed="rId2"/>
-          <a:stretch>
-            <a:fillRect/>
-          </a:stretch>
-        </p:blipFill>
-        <p:spPr>
-          <a:xfrm>
-            <a:off x="495005" y="11327"/>
-            <a:ext cx="11195907" cy="5458005"/>
-          </a:xfrm>
-          <a:prstGeom prst="rect">
-            <a:avLst/>
-          </a:prstGeom>
-        </p:spPr>
-      </p:pic>
       <p:cxnSp>
         <p:nvCxnSpPr>
           <p:cNvPr id="17" name="Straight Connector 16">
@@ -17924,6 +17894,36 @@
           </a:fontRef>
         </p:style>
       </p:sp>
+      <p:pic>
+        <p:nvPicPr>
+          <p:cNvPr id="5" name="Immagine 4" descr="Immagine che contiene testo, mappa, documento&#10;&#10;Descrizione generata automaticamente">
+            <a:extLst>
+              <a:ext uri="{FF2B5EF4-FFF2-40B4-BE49-F238E27FC236}">
+                <a16:creationId xmlns:a16="http://schemas.microsoft.com/office/drawing/2014/main" id="{10595C54-0CC2-4BAE-8B20-EA551698CB04}"/>
+              </a:ext>
+            </a:extLst>
+          </p:cNvPr>
+          <p:cNvPicPr>
+            <a:picLocks noChangeAspect="1"/>
+          </p:cNvPicPr>
+          <p:nvPr/>
+        </p:nvPicPr>
+        <p:blipFill>
+          <a:blip r:embed="rId2"/>
+          <a:stretch>
+            <a:fillRect/>
+          </a:stretch>
+        </p:blipFill>
+        <p:spPr>
+          <a:xfrm>
+            <a:off x="712860" y="176864"/>
+            <a:ext cx="10760197" cy="5245596"/>
+          </a:xfrm>
+          <a:prstGeom prst="rect">
+            <a:avLst/>
+          </a:prstGeom>
+        </p:spPr>
+      </p:pic>
     </p:spTree>
     <p:extLst>
       <p:ext uri="{BB962C8B-B14F-4D97-AF65-F5344CB8AC3E}">
@@ -18275,36 +18275,6 @@
           </a:p>
         </p:txBody>
       </p:sp>
-      <p:pic>
-        <p:nvPicPr>
-          <p:cNvPr id="5" name="Immagine 4">
-            <a:extLst>
-              <a:ext uri="{FF2B5EF4-FFF2-40B4-BE49-F238E27FC236}">
-                <a16:creationId xmlns:a16="http://schemas.microsoft.com/office/drawing/2014/main" id="{9E2ABA8B-ECA4-4699-82C2-946BD71006C3}"/>
-              </a:ext>
-            </a:extLst>
-          </p:cNvPr>
-          <p:cNvPicPr>
-            <a:picLocks noChangeAspect="1"/>
-          </p:cNvPicPr>
-          <p:nvPr/>
-        </p:nvPicPr>
-        <p:blipFill>
-          <a:blip r:embed="rId2"/>
-          <a:stretch>
-            <a:fillRect/>
-          </a:stretch>
-        </p:blipFill>
-        <p:spPr>
-          <a:xfrm>
-            <a:off x="480798" y="-32004"/>
-            <a:ext cx="11329237" cy="5523003"/>
-          </a:xfrm>
-          <a:prstGeom prst="rect">
-            <a:avLst/>
-          </a:prstGeom>
-        </p:spPr>
-      </p:pic>
       <p:cxnSp>
         <p:nvCxnSpPr>
           <p:cNvPr id="18" name="Straight Connector 17">
@@ -18469,6 +18439,36 @@
           </a:fontRef>
         </p:style>
       </p:sp>
+      <p:pic>
+        <p:nvPicPr>
+          <p:cNvPr id="11" name="Immagine 10">
+            <a:extLst>
+              <a:ext uri="{FF2B5EF4-FFF2-40B4-BE49-F238E27FC236}">
+                <a16:creationId xmlns:a16="http://schemas.microsoft.com/office/drawing/2014/main" id="{BC37403C-6B08-4045-BFA4-44EEA1A5FB7B}"/>
+              </a:ext>
+            </a:extLst>
+          </p:cNvPr>
+          <p:cNvPicPr>
+            <a:picLocks noChangeAspect="1"/>
+          </p:cNvPicPr>
+          <p:nvPr/>
+        </p:nvPicPr>
+        <p:blipFill>
+          <a:blip r:embed="rId2"/>
+          <a:stretch>
+            <a:fillRect/>
+          </a:stretch>
+        </p:blipFill>
+        <p:spPr>
+          <a:xfrm>
+            <a:off x="765318" y="169214"/>
+            <a:ext cx="10760197" cy="5245596"/>
+          </a:xfrm>
+          <a:prstGeom prst="rect">
+            <a:avLst/>
+          </a:prstGeom>
+        </p:spPr>
+      </p:pic>
     </p:spTree>
     <p:extLst>
       <p:ext uri="{BB962C8B-B14F-4D97-AF65-F5344CB8AC3E}">
@@ -19617,7 +19617,7 @@
           <a:lstStyle/>
           <a:p>
             <a:r>
-              <a:rPr lang="it-IT" sz="3600" b="1">
+              <a:rPr lang="it-IT" sz="3600" b="1" dirty="0">
                 <a:solidFill>
                   <a:srgbClr val="FFFFFF"/>
                 </a:solidFill>
@@ -19656,32 +19656,58 @@
           <a:lstStyle/>
           <a:p>
             <a:r>
-              <a:rPr lang="it-IT" sz="1500">
+              <a:rPr lang="it-IT" sz="1500" dirty="0">
                 <a:solidFill>
                   <a:srgbClr val="FFFFFF"/>
                 </a:solidFill>
               </a:rPr>
-              <a:t>Modello identificato su dati senza periodi di festivita per migliorare predizione dei giorni «normali»</a:t>
-            </a:r>
-          </a:p>
-          <a:p>
-            <a:r>
-              <a:rPr lang="it-IT" sz="1500">
+              <a:t>Il modello finale è stato identificato sui dati senza i periodi di </a:t>
+            </a:r>
+            <a:r>
+              <a:rPr lang="it-IT" sz="1500" dirty="0" err="1">
                 <a:solidFill>
                   <a:srgbClr val="FFFFFF"/>
                 </a:solidFill>
               </a:rPr>
-              <a:t>Media valori durante periodi di festivita, poi sommati al modello finale nei giorni festivi. SSR di validazione migliora.</a:t>
-            </a:r>
-          </a:p>
-          <a:p>
-            <a:r>
-              <a:rPr lang="it-IT" sz="1500">
+              <a:t>festivià</a:t>
+            </a:r>
+            <a:r>
+              <a:rPr lang="it-IT" sz="1500" dirty="0">
                 <a:solidFill>
                   <a:srgbClr val="FFFFFF"/>
                 </a:solidFill>
               </a:rPr>
-              <a:t>SSR = …</a:t>
+              <a:t> (natale e ferragosto) per migliorare la predizione dei giorni «normali».</a:t>
+            </a:r>
+          </a:p>
+          <a:p>
+            <a:r>
+              <a:rPr lang="it-IT" sz="1500" dirty="0">
+                <a:solidFill>
+                  <a:srgbClr val="FFFFFF"/>
+                </a:solidFill>
+              </a:rPr>
+              <a:t>Sui valori dei dati assunti in questi periodi festivi è stata fatta una media che è stata poi sommata al modello finale come «indice di correzione»</a:t>
+            </a:r>
+          </a:p>
+          <a:p>
+            <a:r>
+              <a:rPr lang="it-IT" sz="1500" dirty="0">
+                <a:solidFill>
+                  <a:srgbClr val="FFFFFF"/>
+                </a:solidFill>
+              </a:rPr>
+              <a:t>L’SSR di validazione in questo modo migliora.</a:t>
+            </a:r>
+          </a:p>
+          <a:p>
+            <a:r>
+              <a:rPr lang="it-IT" sz="1500" b="1" dirty="0">
+                <a:solidFill>
+                  <a:srgbClr val="FFFFFF"/>
+                </a:solidFill>
+              </a:rPr>
+              <a:t>SSR = 1.186772448087091e+03</a:t>
             </a:r>
           </a:p>
         </p:txBody>
@@ -20213,12 +20239,8 @@
               <a:t>Detrendizzazione</a:t>
             </a:r>
             <a:r>
-              <a:rPr lang="it-IT" u="sng" dirty="0"/>
-              <a:t>: </a:t>
-            </a:r>
-            <a:r>
               <a:rPr lang="it-IT" dirty="0"/>
-              <a:t>stima del trend dei 2 anni</a:t>
+              <a:t>: stima del trend dei 2 anni</a:t>
             </a:r>
           </a:p>
           <a:p>
@@ -20228,7 +20250,7 @@
             </a:r>
             <a:r>
               <a:rPr lang="it-IT" u="sng" dirty="0"/>
-              <a:t>sui dati dei 2 anni forniti</a:t>
+              <a:t>sui 2 anni di dati forniti</a:t>
             </a:r>
           </a:p>
           <a:p>
@@ -20257,11 +20279,11 @@
           <a:p>
             <a:r>
               <a:rPr lang="it-IT" u="sng" dirty="0"/>
-              <a:t>Trend: </a:t>
+              <a:t>Trend</a:t>
             </a:r>
             <a:r>
               <a:rPr lang="it-IT" dirty="0"/>
-              <a:t>estensione dell’ultimo valore del trend che viene sommato ai dati di previsione</a:t>
+              <a:t>: estensione dell’ultimo valore del trend che viene sommato ai dati di previsione</a:t>
             </a:r>
           </a:p>
           <a:p>
@@ -21314,7 +21336,7 @@
         </p:spPr>
         <p:txBody>
           <a:bodyPr>
-            <a:normAutofit lnSpcReduction="10000"/>
+            <a:normAutofit fontScale="92500" lnSpcReduction="10000"/>
           </a:bodyPr>
           <a:lstStyle/>
           <a:p>
@@ -21327,7 +21349,7 @@
             </a:r>
             <a:r>
               <a:rPr lang="it-IT" b="1" i="1" dirty="0"/>
-              <a:t> costituita da 6 armoniche, di periodo 7</a:t>
+              <a:t> costituita da 6 armoniche, di periodo 7.</a:t>
             </a:r>
           </a:p>
           <a:p>
@@ -21402,8 +21424,8 @@
         </p:nvSpPr>
         <p:spPr>
           <a:xfrm>
-            <a:off x="2128422" y="3396772"/>
-            <a:ext cx="8869680" cy="1569660"/>
+            <a:off x="2119544" y="2858570"/>
+            <a:ext cx="8869680" cy="2092881"/>
           </a:xfrm>
           <a:prstGeom prst="rect">
             <a:avLst/>
@@ -21414,6 +21436,32 @@
             <a:spAutoFit/>
           </a:bodyPr>
           <a:lstStyle/>
+          <a:p>
+            <a:r>
+              <a:rPr lang="it-IT" dirty="0" err="1"/>
+              <a:t>w_settimanale</a:t>
+            </a:r>
+            <a:r>
+              <a:rPr lang="it-IT" dirty="0"/>
+              <a:t> = 2*</a:t>
+            </a:r>
+            <a:r>
+              <a:rPr lang="it-IT" dirty="0" err="1"/>
+              <a:t>pi</a:t>
+            </a:r>
+            <a:r>
+              <a:rPr lang="it-IT" dirty="0"/>
+              <a:t>/7;</a:t>
+            </a:r>
+          </a:p>
+          <a:p>
+            <a:endParaRPr lang="it-IT" sz="1600" dirty="0">
+              <a:solidFill>
+                <a:srgbClr val="000000"/>
+              </a:solidFill>
+              <a:latin typeface="Courier New" panose="02070309020205020404" pitchFamily="49" charset="0"/>
+            </a:endParaRPr>
+          </a:p>
           <a:p>
             <a:r>
               <a:rPr lang="it-IT" sz="1600" dirty="0" err="1">
@@ -21930,8 +21978,8 @@
         </p:nvSpPr>
         <p:spPr>
           <a:xfrm>
-            <a:off x="887767" y="3032115"/>
-            <a:ext cx="11122356" cy="2554545"/>
+            <a:off x="1069644" y="2657386"/>
+            <a:ext cx="11122356" cy="3077766"/>
           </a:xfrm>
           <a:prstGeom prst="rect">
             <a:avLst/>
@@ -21942,6 +21990,32 @@
             <a:spAutoFit/>
           </a:bodyPr>
           <a:lstStyle/>
+          <a:p>
+            <a:r>
+              <a:rPr lang="it-IT" dirty="0" err="1"/>
+              <a:t>w_annuale</a:t>
+            </a:r>
+            <a:r>
+              <a:rPr lang="it-IT" dirty="0"/>
+              <a:t> = 2*</a:t>
+            </a:r>
+            <a:r>
+              <a:rPr lang="it-IT" dirty="0" err="1"/>
+              <a:t>pi</a:t>
+            </a:r>
+            <a:r>
+              <a:rPr lang="it-IT" dirty="0"/>
+              <a:t>/365;</a:t>
+            </a:r>
+          </a:p>
+          <a:p>
+            <a:endParaRPr lang="it-IT" sz="1600" dirty="0">
+              <a:solidFill>
+                <a:srgbClr val="000000"/>
+              </a:solidFill>
+              <a:latin typeface="Courier New" panose="02070309020205020404" pitchFamily="49" charset="0"/>
+            </a:endParaRPr>
+          </a:p>
           <a:p>
             <a:r>
               <a:rPr lang="it-IT" sz="1600" dirty="0" err="1">

</xml_diff>